<commit_message>
writing lecture for chapter 9
</commit_message>
<xml_diff>
--- a/Chapter04-NetLogo/Chapter4-Lecture.pptx
+++ b/Chapter04-NetLogo/Chapter4-Lecture.pptx
@@ -232,7 +232,7 @@
           <a:p>
             <a:fld id="{F6D62079-0CEF-EC46-96DF-4682CC1C2090}" type="datetimeFigureOut">
               <a:rPr lang="en-US" smtClean="0"/>
-              <a:t>11/9/18</a:t>
+              <a:t>11/27/18</a:t>
             </a:fld>
             <a:endParaRPr lang="en-US"/>
           </a:p>
@@ -737,7 +737,7 @@
           <a:p>
             <a:fld id="{53326AB7-C146-8643-AC32-1D896C71A7F3}" type="datetimeFigureOut">
               <a:rPr lang="en-US" smtClean="0"/>
-              <a:t>11/9/18</a:t>
+              <a:t>11/27/18</a:t>
             </a:fld>
             <a:endParaRPr lang="en-US"/>
           </a:p>
@@ -935,7 +935,7 @@
           <a:p>
             <a:fld id="{53326AB7-C146-8643-AC32-1D896C71A7F3}" type="datetimeFigureOut">
               <a:rPr lang="en-US" smtClean="0"/>
-              <a:t>11/9/18</a:t>
+              <a:t>11/27/18</a:t>
             </a:fld>
             <a:endParaRPr lang="en-US"/>
           </a:p>
@@ -1143,7 +1143,7 @@
           <a:p>
             <a:fld id="{53326AB7-C146-8643-AC32-1D896C71A7F3}" type="datetimeFigureOut">
               <a:rPr lang="en-US" smtClean="0"/>
-              <a:t>11/9/18</a:t>
+              <a:t>11/27/18</a:t>
             </a:fld>
             <a:endParaRPr lang="en-US"/>
           </a:p>
@@ -1341,7 +1341,7 @@
           <a:p>
             <a:fld id="{53326AB7-C146-8643-AC32-1D896C71A7F3}" type="datetimeFigureOut">
               <a:rPr lang="en-US" smtClean="0"/>
-              <a:t>11/9/18</a:t>
+              <a:t>11/27/18</a:t>
             </a:fld>
             <a:endParaRPr lang="en-US"/>
           </a:p>
@@ -1616,7 +1616,7 @@
           <a:p>
             <a:fld id="{53326AB7-C146-8643-AC32-1D896C71A7F3}" type="datetimeFigureOut">
               <a:rPr lang="en-US" smtClean="0"/>
-              <a:t>11/9/18</a:t>
+              <a:t>11/27/18</a:t>
             </a:fld>
             <a:endParaRPr lang="en-US"/>
           </a:p>
@@ -1881,7 +1881,7 @@
           <a:p>
             <a:fld id="{53326AB7-C146-8643-AC32-1D896C71A7F3}" type="datetimeFigureOut">
               <a:rPr lang="en-US" smtClean="0"/>
-              <a:t>11/9/18</a:t>
+              <a:t>11/27/18</a:t>
             </a:fld>
             <a:endParaRPr lang="en-US"/>
           </a:p>
@@ -2293,7 +2293,7 @@
           <a:p>
             <a:fld id="{53326AB7-C146-8643-AC32-1D896C71A7F3}" type="datetimeFigureOut">
               <a:rPr lang="en-US" smtClean="0"/>
-              <a:t>11/9/18</a:t>
+              <a:t>11/27/18</a:t>
             </a:fld>
             <a:endParaRPr lang="en-US"/>
           </a:p>
@@ -2434,7 +2434,7 @@
           <a:p>
             <a:fld id="{53326AB7-C146-8643-AC32-1D896C71A7F3}" type="datetimeFigureOut">
               <a:rPr lang="en-US" smtClean="0"/>
-              <a:t>11/9/18</a:t>
+              <a:t>11/27/18</a:t>
             </a:fld>
             <a:endParaRPr lang="en-US"/>
           </a:p>
@@ -2547,7 +2547,7 @@
           <a:p>
             <a:fld id="{53326AB7-C146-8643-AC32-1D896C71A7F3}" type="datetimeFigureOut">
               <a:rPr lang="en-US" smtClean="0"/>
-              <a:t>11/9/18</a:t>
+              <a:t>11/27/18</a:t>
             </a:fld>
             <a:endParaRPr lang="en-US"/>
           </a:p>
@@ -2858,7 +2858,7 @@
           <a:p>
             <a:fld id="{53326AB7-C146-8643-AC32-1D896C71A7F3}" type="datetimeFigureOut">
               <a:rPr lang="en-US" smtClean="0"/>
-              <a:t>11/9/18</a:t>
+              <a:t>11/27/18</a:t>
             </a:fld>
             <a:endParaRPr lang="en-US"/>
           </a:p>
@@ -3146,7 +3146,7 @@
           <a:p>
             <a:fld id="{53326AB7-C146-8643-AC32-1D896C71A7F3}" type="datetimeFigureOut">
               <a:rPr lang="en-US" smtClean="0"/>
-              <a:t>11/9/18</a:t>
+              <a:t>11/27/18</a:t>
             </a:fld>
             <a:endParaRPr lang="en-US"/>
           </a:p>
@@ -3387,7 +3387,7 @@
           <a:p>
             <a:fld id="{53326AB7-C146-8643-AC32-1D896C71A7F3}" type="datetimeFigureOut">
               <a:rPr lang="en-US" smtClean="0"/>
-              <a:t>11/9/18</a:t>
+              <a:t>11/27/18</a:t>
             </a:fld>
             <a:endParaRPr lang="en-US"/>
           </a:p>
@@ -5734,9 +5734,22 @@
           <a:bodyPr/>
           <a:lstStyle/>
           <a:p>
+            <a:pPr marL="0" indent="0">
+              <a:buNone/>
+            </a:pPr>
+            <a:r>
+              <a:rPr lang="en-US"/>
+              <a:t>By the end of this chapter, students will be able to:</a:t>
+            </a:r>
+          </a:p>
+          <a:p>
+            <a:r>
+              <a:rPr lang="en-US"/>
+              <a:t>Identify </a:t>
+            </a:r>
             <a:r>
               <a:rPr lang="en-US" dirty="0"/>
-              <a:t>Become aware of some of the tools that are commonly used to do agent-based modelling</a:t>
+              <a:t>some of the tools that are commonly used to do agent-based modelling</a:t>
             </a:r>
           </a:p>
           <a:p>

</xml_diff>